<commit_message>
Updated slide: Syncing with remote
</commit_message>
<xml_diff>
--- a/Analysis Workflow using Git, Python, and Jupyter/Slides/Git workflow.pptx
+++ b/Analysis Workflow using Git, Python, and Jupyter/Slides/Git workflow.pptx
@@ -15001,7 +15001,7 @@
         </p:spPr>
         <p:txBody>
           <a:bodyPr anchorCtr="0" anchor="t" bIns="91425" lIns="91425" spcFirstLastPara="1" rIns="91425" wrap="square" tIns="91425">
-            <a:normAutofit fontScale="55000" lnSpcReduction="10000"/>
+            <a:normAutofit fontScale="47500" lnSpcReduction="20000"/>
           </a:bodyPr>
           <a:lstStyle/>
           <a:p>
@@ -15110,7 +15110,51 @@
               </a:rPr>
               <a:t>ssh-keygen -o</a:t>
             </a:r>
-            <a:endParaRPr/>
+            <a:endParaRPr>
+              <a:solidFill>
+                <a:schemeClr val="accent4"/>
+              </a:solidFill>
+            </a:endParaRPr>
+          </a:p>
+          <a:p>
+            <a:pPr indent="0" lvl="0" marL="0" rtl="0" algn="l">
+              <a:spcBef>
+                <a:spcPts val="1200"/>
+              </a:spcBef>
+              <a:spcAft>
+                <a:spcPts val="0"/>
+              </a:spcAft>
+              <a:buNone/>
+            </a:pPr>
+            <a:r>
+              <a:rPr lang="en"/>
+              <a:t>## Print your key in the terminal</a:t>
+            </a:r>
+            <a:endParaRPr/>
+          </a:p>
+          <a:p>
+            <a:pPr indent="0" lvl="0" marL="0" rtl="0" algn="l">
+              <a:spcBef>
+                <a:spcPts val="1200"/>
+              </a:spcBef>
+              <a:spcAft>
+                <a:spcPts val="0"/>
+              </a:spcAft>
+              <a:buNone/>
+            </a:pPr>
+            <a:r>
+              <a:rPr lang="en">
+                <a:solidFill>
+                  <a:schemeClr val="accent4"/>
+                </a:solidFill>
+              </a:rPr>
+              <a:t>cat ~/.ssh/id_rsa.pub</a:t>
+            </a:r>
+            <a:endParaRPr>
+              <a:solidFill>
+                <a:schemeClr val="accent4"/>
+              </a:solidFill>
+            </a:endParaRPr>
           </a:p>
           <a:p>
             <a:pPr indent="0" lvl="0" marL="0" rtl="0" algn="l">

</xml_diff>